<commit_message>
Tweaks in pages 1-6
</commit_message>
<xml_diff>
--- a/wip-design/figures/thegamma-more.pptx
+++ b/wip-design/figures/thegamma-more.pptx
@@ -104,6 +104,11 @@
       </a:defRPr>
     </a:lvl9pPr>
   </p:defaultTextStyle>
+  <p:extLst>
+    <p:ext uri="{EFAFB233-063F-42B5-8137-9DF3F51BA10A}">
+      <p15:sldGuideLst xmlns:p15="http://schemas.microsoft.com/office/powerpoint/2012/main"/>
+    </p:ext>
+  </p:extLst>
 </p:presentation>
 </file>
 
@@ -238,7 +243,7 @@
           <a:p>
             <a:fld id="{83B4BBB6-9BD8-4D7C-BB9E-7BCEFC8BDD28}" type="datetimeFigureOut">
               <a:rPr lang="en-US" smtClean="0"/>
-              <a:t>9/11/2020</a:t>
+              <a:t>3/22/2021</a:t>
             </a:fld>
             <a:endParaRPr lang="en-US"/>
           </a:p>
@@ -408,7 +413,7 @@
           <a:p>
             <a:fld id="{83B4BBB6-9BD8-4D7C-BB9E-7BCEFC8BDD28}" type="datetimeFigureOut">
               <a:rPr lang="en-US" smtClean="0"/>
-              <a:t>9/11/2020</a:t>
+              <a:t>3/22/2021</a:t>
             </a:fld>
             <a:endParaRPr lang="en-US"/>
           </a:p>
@@ -588,7 +593,7 @@
           <a:p>
             <a:fld id="{83B4BBB6-9BD8-4D7C-BB9E-7BCEFC8BDD28}" type="datetimeFigureOut">
               <a:rPr lang="en-US" smtClean="0"/>
-              <a:t>9/11/2020</a:t>
+              <a:t>3/22/2021</a:t>
             </a:fld>
             <a:endParaRPr lang="en-US"/>
           </a:p>
@@ -758,7 +763,7 @@
           <a:p>
             <a:fld id="{83B4BBB6-9BD8-4D7C-BB9E-7BCEFC8BDD28}" type="datetimeFigureOut">
               <a:rPr lang="en-US" smtClean="0"/>
-              <a:t>9/11/2020</a:t>
+              <a:t>3/22/2021</a:t>
             </a:fld>
             <a:endParaRPr lang="en-US"/>
           </a:p>
@@ -1002,7 +1007,7 @@
           <a:p>
             <a:fld id="{83B4BBB6-9BD8-4D7C-BB9E-7BCEFC8BDD28}" type="datetimeFigureOut">
               <a:rPr lang="en-US" smtClean="0"/>
-              <a:t>9/11/2020</a:t>
+              <a:t>3/22/2021</a:t>
             </a:fld>
             <a:endParaRPr lang="en-US"/>
           </a:p>
@@ -1234,7 +1239,7 @@
           <a:p>
             <a:fld id="{83B4BBB6-9BD8-4D7C-BB9E-7BCEFC8BDD28}" type="datetimeFigureOut">
               <a:rPr lang="en-US" smtClean="0"/>
-              <a:t>9/11/2020</a:t>
+              <a:t>3/22/2021</a:t>
             </a:fld>
             <a:endParaRPr lang="en-US"/>
           </a:p>
@@ -1601,7 +1606,7 @@
           <a:p>
             <a:fld id="{83B4BBB6-9BD8-4D7C-BB9E-7BCEFC8BDD28}" type="datetimeFigureOut">
               <a:rPr lang="en-US" smtClean="0"/>
-              <a:t>9/11/2020</a:t>
+              <a:t>3/22/2021</a:t>
             </a:fld>
             <a:endParaRPr lang="en-US"/>
           </a:p>
@@ -1719,7 +1724,7 @@
           <a:p>
             <a:fld id="{83B4BBB6-9BD8-4D7C-BB9E-7BCEFC8BDD28}" type="datetimeFigureOut">
               <a:rPr lang="en-US" smtClean="0"/>
-              <a:t>9/11/2020</a:t>
+              <a:t>3/22/2021</a:t>
             </a:fld>
             <a:endParaRPr lang="en-US"/>
           </a:p>
@@ -1814,7 +1819,7 @@
           <a:p>
             <a:fld id="{83B4BBB6-9BD8-4D7C-BB9E-7BCEFC8BDD28}" type="datetimeFigureOut">
               <a:rPr lang="en-US" smtClean="0"/>
-              <a:t>9/11/2020</a:t>
+              <a:t>3/22/2021</a:t>
             </a:fld>
             <a:endParaRPr lang="en-US"/>
           </a:p>
@@ -2091,7 +2096,7 @@
           <a:p>
             <a:fld id="{83B4BBB6-9BD8-4D7C-BB9E-7BCEFC8BDD28}" type="datetimeFigureOut">
               <a:rPr lang="en-US" smtClean="0"/>
-              <a:t>9/11/2020</a:t>
+              <a:t>3/22/2021</a:t>
             </a:fld>
             <a:endParaRPr lang="en-US"/>
           </a:p>
@@ -2348,7 +2353,7 @@
           <a:p>
             <a:fld id="{83B4BBB6-9BD8-4D7C-BB9E-7BCEFC8BDD28}" type="datetimeFigureOut">
               <a:rPr lang="en-US" smtClean="0"/>
-              <a:t>9/11/2020</a:t>
+              <a:t>3/22/2021</a:t>
             </a:fld>
             <a:endParaRPr lang="en-US"/>
           </a:p>
@@ -2561,7 +2566,7 @@
           <a:p>
             <a:fld id="{83B4BBB6-9BD8-4D7C-BB9E-7BCEFC8BDD28}" type="datetimeFigureOut">
               <a:rPr lang="en-US" smtClean="0"/>
-              <a:t>9/11/2020</a:t>
+              <a:t>3/22/2021</a:t>
             </a:fld>
             <a:endParaRPr lang="en-US"/>
           </a:p>
@@ -2968,10 +2973,10 @@
       </p:grpSpPr>
       <p:pic>
         <p:nvPicPr>
-          <p:cNvPr id="77" name="Picture 76">
+          <p:cNvPr id="91" name="Picture 90">
             <a:extLst>
               <a:ext uri="{FF2B5EF4-FFF2-40B4-BE49-F238E27FC236}">
-                <a16:creationId xmlns:a16="http://schemas.microsoft.com/office/drawing/2014/main" id="{8A238C98-61A4-478E-9D87-CBC12F93D7BE}"/>
+                <a16:creationId xmlns:a16="http://schemas.microsoft.com/office/drawing/2014/main" id="{B85B2A21-FFD9-474F-B1A5-C0219F05F567}"/>
               </a:ext>
             </a:extLst>
           </p:cNvPr>
@@ -2988,338 +2993,8 @@
         </p:blipFill>
         <p:spPr>
           <a:xfrm>
-            <a:off x="5499151" y="2542282"/>
-            <a:ext cx="3722890" cy="899286"/>
-          </a:xfrm>
-          <a:prstGeom prst="rect">
-            <a:avLst/>
-          </a:prstGeom>
-        </p:spPr>
-      </p:pic>
-      <p:pic>
-        <p:nvPicPr>
-          <p:cNvPr id="79" name="Picture 78">
-            <a:extLst>
-              <a:ext uri="{FF2B5EF4-FFF2-40B4-BE49-F238E27FC236}">
-                <a16:creationId xmlns:a16="http://schemas.microsoft.com/office/drawing/2014/main" id="{C95B7385-5AA6-4A54-9A4A-321EEA6A46AD}"/>
-              </a:ext>
-            </a:extLst>
-          </p:cNvPr>
-          <p:cNvPicPr>
-            <a:picLocks noChangeAspect="1"/>
-          </p:cNvPicPr>
-          <p:nvPr/>
-        </p:nvPicPr>
-        <p:blipFill>
-          <a:blip r:embed="rId3"/>
-          <a:stretch>
-            <a:fillRect/>
-          </a:stretch>
-        </p:blipFill>
-        <p:spPr>
-          <a:xfrm>
-            <a:off x="5499151" y="454431"/>
-            <a:ext cx="3722890" cy="899286"/>
-          </a:xfrm>
-          <a:prstGeom prst="rect">
-            <a:avLst/>
-          </a:prstGeom>
-        </p:spPr>
-      </p:pic>
-      <p:pic>
-        <p:nvPicPr>
-          <p:cNvPr id="81" name="Picture 80">
-            <a:extLst>
-              <a:ext uri="{FF2B5EF4-FFF2-40B4-BE49-F238E27FC236}">
-                <a16:creationId xmlns:a16="http://schemas.microsoft.com/office/drawing/2014/main" id="{0F469C1C-6011-413B-BD08-4468E282C2E3}"/>
-              </a:ext>
-            </a:extLst>
-          </p:cNvPr>
-          <p:cNvPicPr>
-            <a:picLocks noChangeAspect="1"/>
-          </p:cNvPicPr>
-          <p:nvPr/>
-        </p:nvPicPr>
-        <p:blipFill>
-          <a:blip r:embed="rId4"/>
-          <a:stretch>
-            <a:fillRect/>
-          </a:stretch>
-        </p:blipFill>
-        <p:spPr>
-          <a:xfrm>
-            <a:off x="421532" y="2537660"/>
-            <a:ext cx="3722890" cy="899286"/>
-          </a:xfrm>
-          <a:prstGeom prst="rect">
-            <a:avLst/>
-          </a:prstGeom>
-        </p:spPr>
-      </p:pic>
-      <p:pic>
-        <p:nvPicPr>
-          <p:cNvPr id="83" name="Picture 82">
-            <a:extLst>
-              <a:ext uri="{FF2B5EF4-FFF2-40B4-BE49-F238E27FC236}">
-                <a16:creationId xmlns:a16="http://schemas.microsoft.com/office/drawing/2014/main" id="{A8A8B42C-79A6-46D9-947E-0850F7C19D26}"/>
-              </a:ext>
-            </a:extLst>
-          </p:cNvPr>
-          <p:cNvPicPr>
-            <a:picLocks noChangeAspect="1"/>
-          </p:cNvPicPr>
-          <p:nvPr/>
-        </p:nvPicPr>
-        <p:blipFill>
-          <a:blip r:embed="rId5"/>
-          <a:stretch>
-            <a:fillRect/>
-          </a:stretch>
-        </p:blipFill>
-        <p:spPr>
-          <a:xfrm>
-            <a:off x="421532" y="454431"/>
-            <a:ext cx="3722890" cy="899286"/>
-          </a:xfrm>
-          <a:prstGeom prst="rect">
-            <a:avLst/>
-          </a:prstGeom>
-        </p:spPr>
-      </p:pic>
-      <p:pic>
-        <p:nvPicPr>
-          <p:cNvPr id="85" name="Picture 84">
-            <a:extLst>
-              <a:ext uri="{FF2B5EF4-FFF2-40B4-BE49-F238E27FC236}">
-                <a16:creationId xmlns:a16="http://schemas.microsoft.com/office/drawing/2014/main" id="{D0B4A754-E053-42F9-98E3-9936C675406A}"/>
-              </a:ext>
-            </a:extLst>
-          </p:cNvPr>
-          <p:cNvPicPr>
-            <a:picLocks noChangeAspect="1"/>
-          </p:cNvPicPr>
-          <p:nvPr/>
-        </p:nvPicPr>
-        <p:blipFill>
-          <a:blip r:embed="rId6"/>
-          <a:stretch>
-            <a:fillRect/>
-          </a:stretch>
-        </p:blipFill>
-        <p:spPr>
-          <a:xfrm>
-            <a:off x="762230" y="771935"/>
-            <a:ext cx="3415820" cy="1259368"/>
-          </a:xfrm>
-          <a:prstGeom prst="rect">
-            <a:avLst/>
-          </a:prstGeom>
-        </p:spPr>
-      </p:pic>
-      <p:pic>
-        <p:nvPicPr>
-          <p:cNvPr id="87" name="Picture 86">
-            <a:extLst>
-              <a:ext uri="{FF2B5EF4-FFF2-40B4-BE49-F238E27FC236}">
-                <a16:creationId xmlns:a16="http://schemas.microsoft.com/office/drawing/2014/main" id="{599483C6-5C07-4752-A701-79B5F1BD2BEF}"/>
-              </a:ext>
-            </a:extLst>
-          </p:cNvPr>
-          <p:cNvPicPr>
-            <a:picLocks noChangeAspect="1"/>
-          </p:cNvPicPr>
-          <p:nvPr/>
-        </p:nvPicPr>
-        <p:blipFill>
-          <a:blip r:embed="rId7"/>
-          <a:stretch>
-            <a:fillRect/>
-          </a:stretch>
-        </p:blipFill>
-        <p:spPr>
-          <a:xfrm>
-            <a:off x="5831734" y="1054933"/>
-            <a:ext cx="3414584" cy="1258913"/>
-          </a:xfrm>
-          <a:prstGeom prst="rect">
-            <a:avLst/>
-          </a:prstGeom>
-        </p:spPr>
-      </p:pic>
-      <p:pic>
-        <p:nvPicPr>
-          <p:cNvPr id="89" name="Picture 88">
-            <a:extLst>
-              <a:ext uri="{FF2B5EF4-FFF2-40B4-BE49-F238E27FC236}">
-                <a16:creationId xmlns:a16="http://schemas.microsoft.com/office/drawing/2014/main" id="{51CAC3FB-C29B-48A4-AD56-F771FF508696}"/>
-              </a:ext>
-            </a:extLst>
-          </p:cNvPr>
-          <p:cNvPicPr>
-            <a:picLocks noChangeAspect="1"/>
-          </p:cNvPicPr>
-          <p:nvPr/>
-        </p:nvPicPr>
-        <p:blipFill>
-          <a:blip r:embed="rId8"/>
-          <a:stretch>
-            <a:fillRect/>
-          </a:stretch>
-        </p:blipFill>
-        <p:spPr>
-          <a:xfrm>
-            <a:off x="763466" y="2895008"/>
-            <a:ext cx="3414584" cy="1407223"/>
-          </a:xfrm>
-          <a:prstGeom prst="rect">
-            <a:avLst/>
-          </a:prstGeom>
-        </p:spPr>
-      </p:pic>
-      <p:pic>
-        <p:nvPicPr>
-          <p:cNvPr id="91" name="Picture 90">
-            <a:extLst>
-              <a:ext uri="{FF2B5EF4-FFF2-40B4-BE49-F238E27FC236}">
-                <a16:creationId xmlns:a16="http://schemas.microsoft.com/office/drawing/2014/main" id="{B85B2A21-FFD9-474F-B1A5-C0219F05F567}"/>
-              </a:ext>
-            </a:extLst>
-          </p:cNvPr>
-          <p:cNvPicPr>
-            <a:picLocks noChangeAspect="1"/>
-          </p:cNvPicPr>
-          <p:nvPr/>
-        </p:nvPicPr>
-        <p:blipFill>
-          <a:blip r:embed="rId9"/>
-          <a:stretch>
-            <a:fillRect/>
-          </a:stretch>
-        </p:blipFill>
-        <p:spPr>
-          <a:xfrm>
             <a:off x="5320097" y="5736548"/>
             <a:ext cx="4080999" cy="1837031"/>
-          </a:xfrm>
-          <a:prstGeom prst="rect">
-            <a:avLst/>
-          </a:prstGeom>
-        </p:spPr>
-      </p:pic>
-      <p:pic>
-        <p:nvPicPr>
-          <p:cNvPr id="93" name="Picture 92">
-            <a:extLst>
-              <a:ext uri="{FF2B5EF4-FFF2-40B4-BE49-F238E27FC236}">
-                <a16:creationId xmlns:a16="http://schemas.microsoft.com/office/drawing/2014/main" id="{038006D3-B3EE-427B-AE1F-0FE467F2F1CE}"/>
-              </a:ext>
-            </a:extLst>
-          </p:cNvPr>
-          <p:cNvPicPr>
-            <a:picLocks noChangeAspect="1"/>
-          </p:cNvPicPr>
-          <p:nvPr/>
-        </p:nvPicPr>
-        <p:blipFill>
-          <a:blip r:embed="rId10"/>
-          <a:stretch>
-            <a:fillRect/>
-          </a:stretch>
-        </p:blipFill>
-        <p:spPr>
-          <a:xfrm>
-            <a:off x="5499151" y="4610366"/>
-            <a:ext cx="3722890" cy="899286"/>
-          </a:xfrm>
-          <a:prstGeom prst="rect">
-            <a:avLst/>
-          </a:prstGeom>
-        </p:spPr>
-      </p:pic>
-      <p:pic>
-        <p:nvPicPr>
-          <p:cNvPr id="95" name="Picture 94">
-            <a:extLst>
-              <a:ext uri="{FF2B5EF4-FFF2-40B4-BE49-F238E27FC236}">
-                <a16:creationId xmlns:a16="http://schemas.microsoft.com/office/drawing/2014/main" id="{8744B4A4-BB84-413F-A25E-8DF71CEC0F65}"/>
-              </a:ext>
-            </a:extLst>
-          </p:cNvPr>
-          <p:cNvPicPr>
-            <a:picLocks noChangeAspect="1"/>
-          </p:cNvPicPr>
-          <p:nvPr/>
-        </p:nvPicPr>
-        <p:blipFill>
-          <a:blip r:embed="rId11"/>
-          <a:stretch>
-            <a:fillRect/>
-          </a:stretch>
-        </p:blipFill>
-        <p:spPr>
-          <a:xfrm>
-            <a:off x="420785" y="4824267"/>
-            <a:ext cx="3722890" cy="899286"/>
-          </a:xfrm>
-          <a:prstGeom prst="rect">
-            <a:avLst/>
-          </a:prstGeom>
-        </p:spPr>
-      </p:pic>
-      <p:pic>
-        <p:nvPicPr>
-          <p:cNvPr id="97" name="Picture 96">
-            <a:extLst>
-              <a:ext uri="{FF2B5EF4-FFF2-40B4-BE49-F238E27FC236}">
-                <a16:creationId xmlns:a16="http://schemas.microsoft.com/office/drawing/2014/main" id="{D7A34AC4-6F9A-4000-97A9-7302D818D3F0}"/>
-              </a:ext>
-            </a:extLst>
-          </p:cNvPr>
-          <p:cNvPicPr>
-            <a:picLocks noChangeAspect="1"/>
-          </p:cNvPicPr>
-          <p:nvPr/>
-        </p:nvPicPr>
-        <p:blipFill>
-          <a:blip r:embed="rId12"/>
-          <a:stretch>
-            <a:fillRect/>
-          </a:stretch>
-        </p:blipFill>
-        <p:spPr>
-          <a:xfrm>
-            <a:off x="420785" y="5399163"/>
-            <a:ext cx="3955407" cy="1898830"/>
-          </a:xfrm>
-          <a:prstGeom prst="rect">
-            <a:avLst/>
-          </a:prstGeom>
-        </p:spPr>
-      </p:pic>
-      <p:pic>
-        <p:nvPicPr>
-          <p:cNvPr id="99" name="Picture 98">
-            <a:extLst>
-              <a:ext uri="{FF2B5EF4-FFF2-40B4-BE49-F238E27FC236}">
-                <a16:creationId xmlns:a16="http://schemas.microsoft.com/office/drawing/2014/main" id="{B0F432C1-B067-4F0D-84DC-8260D1EBF81E}"/>
-              </a:ext>
-            </a:extLst>
-          </p:cNvPr>
-          <p:cNvPicPr>
-            <a:picLocks noChangeAspect="1"/>
-          </p:cNvPicPr>
-          <p:nvPr/>
-        </p:nvPicPr>
-        <p:blipFill>
-          <a:blip r:embed="rId13"/>
-          <a:stretch>
-            <a:fillRect/>
-          </a:stretch>
-        </p:blipFill>
-        <p:spPr>
-          <a:xfrm>
-            <a:off x="5831733" y="3174437"/>
-            <a:ext cx="3390309" cy="1246538"/>
           </a:xfrm>
           <a:prstGeom prst="rect">
             <a:avLst/>
@@ -3734,6 +3409,276 @@
           </a:p>
         </p:txBody>
       </p:sp>
+      <p:pic>
+        <p:nvPicPr>
+          <p:cNvPr id="3" name="Picture 2">
+            <a:extLst>
+              <a:ext uri="{FF2B5EF4-FFF2-40B4-BE49-F238E27FC236}">
+                <a16:creationId xmlns:a16="http://schemas.microsoft.com/office/drawing/2014/main" id="{FECC9C29-6F86-458D-87BA-3CDCB1FE9BE9}"/>
+              </a:ext>
+            </a:extLst>
+          </p:cNvPr>
+          <p:cNvPicPr>
+            <a:picLocks noChangeAspect="1"/>
+          </p:cNvPicPr>
+          <p:nvPr/>
+        </p:nvPicPr>
+        <p:blipFill>
+          <a:blip r:embed="rId3"/>
+          <a:stretch>
+            <a:fillRect/>
+          </a:stretch>
+        </p:blipFill>
+        <p:spPr>
+          <a:xfrm>
+            <a:off x="463876" y="452803"/>
+            <a:ext cx="1133633" cy="319132"/>
+          </a:xfrm>
+          <a:prstGeom prst="rect">
+            <a:avLst/>
+          </a:prstGeom>
+        </p:spPr>
+      </p:pic>
+      <p:pic>
+        <p:nvPicPr>
+          <p:cNvPr id="12" name="Picture 11">
+            <a:extLst>
+              <a:ext uri="{FF2B5EF4-FFF2-40B4-BE49-F238E27FC236}">
+                <a16:creationId xmlns:a16="http://schemas.microsoft.com/office/drawing/2014/main" id="{78F72602-F922-40A6-AE6F-6E5987E9F53D}"/>
+              </a:ext>
+            </a:extLst>
+          </p:cNvPr>
+          <p:cNvPicPr>
+            <a:picLocks noChangeAspect="1"/>
+          </p:cNvPicPr>
+          <p:nvPr/>
+        </p:nvPicPr>
+        <p:blipFill>
+          <a:blip r:embed="rId4"/>
+          <a:stretch>
+            <a:fillRect/>
+          </a:stretch>
+        </p:blipFill>
+        <p:spPr>
+          <a:xfrm>
+            <a:off x="5407852" y="446433"/>
+            <a:ext cx="2124372" cy="309606"/>
+          </a:xfrm>
+          <a:prstGeom prst="rect">
+            <a:avLst/>
+          </a:prstGeom>
+        </p:spPr>
+      </p:pic>
+      <p:pic>
+        <p:nvPicPr>
+          <p:cNvPr id="16" name="Picture 15">
+            <a:extLst>
+              <a:ext uri="{FF2B5EF4-FFF2-40B4-BE49-F238E27FC236}">
+                <a16:creationId xmlns:a16="http://schemas.microsoft.com/office/drawing/2014/main" id="{536E6E18-65FB-4724-879E-CDB1BF268DE0}"/>
+              </a:ext>
+            </a:extLst>
+          </p:cNvPr>
+          <p:cNvPicPr>
+            <a:picLocks noChangeAspect="1"/>
+          </p:cNvPicPr>
+          <p:nvPr/>
+        </p:nvPicPr>
+        <p:blipFill>
+          <a:blip r:embed="rId5"/>
+          <a:stretch>
+            <a:fillRect/>
+          </a:stretch>
+        </p:blipFill>
+        <p:spPr>
+          <a:xfrm>
+            <a:off x="5402514" y="4783915"/>
+            <a:ext cx="3929611" cy="952633"/>
+          </a:xfrm>
+          <a:prstGeom prst="rect">
+            <a:avLst/>
+          </a:prstGeom>
+        </p:spPr>
+      </p:pic>
+      <p:pic>
+        <p:nvPicPr>
+          <p:cNvPr id="28" name="Picture 27">
+            <a:extLst>
+              <a:ext uri="{FF2B5EF4-FFF2-40B4-BE49-F238E27FC236}">
+                <a16:creationId xmlns:a16="http://schemas.microsoft.com/office/drawing/2014/main" id="{9FF849B3-0076-477A-BB3A-BB3E817FC06E}"/>
+              </a:ext>
+            </a:extLst>
+          </p:cNvPr>
+          <p:cNvPicPr>
+            <a:picLocks noChangeAspect="1"/>
+          </p:cNvPicPr>
+          <p:nvPr/>
+        </p:nvPicPr>
+        <p:blipFill>
+          <a:blip r:embed="rId6"/>
+          <a:stretch>
+            <a:fillRect/>
+          </a:stretch>
+        </p:blipFill>
+        <p:spPr>
+          <a:xfrm>
+            <a:off x="5583514" y="790438"/>
+            <a:ext cx="3143689" cy="1448002"/>
+          </a:xfrm>
+          <a:prstGeom prst="rect">
+            <a:avLst/>
+          </a:prstGeom>
+        </p:spPr>
+      </p:pic>
+      <p:pic>
+        <p:nvPicPr>
+          <p:cNvPr id="46" name="Picture 45">
+            <a:extLst>
+              <a:ext uri="{FF2B5EF4-FFF2-40B4-BE49-F238E27FC236}">
+                <a16:creationId xmlns:a16="http://schemas.microsoft.com/office/drawing/2014/main" id="{1834403E-A51F-495B-AE66-CC9C2CB13D4E}"/>
+              </a:ext>
+            </a:extLst>
+          </p:cNvPr>
+          <p:cNvPicPr>
+            <a:picLocks noChangeAspect="1"/>
+          </p:cNvPicPr>
+          <p:nvPr/>
+        </p:nvPicPr>
+        <p:blipFill>
+          <a:blip r:embed="rId7"/>
+          <a:stretch>
+            <a:fillRect/>
+          </a:stretch>
+        </p:blipFill>
+        <p:spPr>
+          <a:xfrm>
+            <a:off x="739884" y="812341"/>
+            <a:ext cx="3143689" cy="1157449"/>
+          </a:xfrm>
+          <a:prstGeom prst="rect">
+            <a:avLst/>
+          </a:prstGeom>
+        </p:spPr>
+      </p:pic>
+      <p:pic>
+        <p:nvPicPr>
+          <p:cNvPr id="48" name="Picture 47">
+            <a:extLst>
+              <a:ext uri="{FF2B5EF4-FFF2-40B4-BE49-F238E27FC236}">
+                <a16:creationId xmlns:a16="http://schemas.microsoft.com/office/drawing/2014/main" id="{2B6283F3-E646-4D34-A7EB-6D03ACFC8262}"/>
+              </a:ext>
+            </a:extLst>
+          </p:cNvPr>
+          <p:cNvPicPr>
+            <a:picLocks noChangeAspect="1"/>
+          </p:cNvPicPr>
+          <p:nvPr/>
+        </p:nvPicPr>
+        <p:blipFill>
+          <a:blip r:embed="rId8"/>
+          <a:stretch>
+            <a:fillRect/>
+          </a:stretch>
+        </p:blipFill>
+        <p:spPr>
+          <a:xfrm>
+            <a:off x="739884" y="2927487"/>
+            <a:ext cx="3143689" cy="1152686"/>
+          </a:xfrm>
+          <a:prstGeom prst="rect">
+            <a:avLst/>
+          </a:prstGeom>
+        </p:spPr>
+      </p:pic>
+      <p:pic>
+        <p:nvPicPr>
+          <p:cNvPr id="36" name="Picture 35">
+            <a:extLst>
+              <a:ext uri="{FF2B5EF4-FFF2-40B4-BE49-F238E27FC236}">
+                <a16:creationId xmlns:a16="http://schemas.microsoft.com/office/drawing/2014/main" id="{3D5A026D-7EEA-4F50-8550-A5FD4BA8648C}"/>
+              </a:ext>
+            </a:extLst>
+          </p:cNvPr>
+          <p:cNvPicPr>
+            <a:picLocks noChangeAspect="1"/>
+          </p:cNvPicPr>
+          <p:nvPr/>
+        </p:nvPicPr>
+        <p:blipFill>
+          <a:blip r:embed="rId9"/>
+          <a:stretch>
+            <a:fillRect/>
+          </a:stretch>
+        </p:blipFill>
+        <p:spPr>
+          <a:xfrm>
+            <a:off x="530465" y="2517308"/>
+            <a:ext cx="1981477" cy="347711"/>
+          </a:xfrm>
+          <a:prstGeom prst="rect">
+            <a:avLst/>
+          </a:prstGeom>
+        </p:spPr>
+      </p:pic>
+      <p:pic>
+        <p:nvPicPr>
+          <p:cNvPr id="38" name="Picture 37">
+            <a:extLst>
+              <a:ext uri="{FF2B5EF4-FFF2-40B4-BE49-F238E27FC236}">
+                <a16:creationId xmlns:a16="http://schemas.microsoft.com/office/drawing/2014/main" id="{5809381E-F5C3-4416-9D7A-50C4C46CC369}"/>
+              </a:ext>
+            </a:extLst>
+          </p:cNvPr>
+          <p:cNvPicPr>
+            <a:picLocks noChangeAspect="1"/>
+          </p:cNvPicPr>
+          <p:nvPr/>
+        </p:nvPicPr>
+        <p:blipFill>
+          <a:blip r:embed="rId10"/>
+          <a:stretch>
+            <a:fillRect/>
+          </a:stretch>
+        </p:blipFill>
+        <p:spPr>
+          <a:xfrm>
+            <a:off x="612090" y="5376443"/>
+            <a:ext cx="4043927" cy="1857634"/>
+          </a:xfrm>
+          <a:prstGeom prst="rect">
+            <a:avLst/>
+          </a:prstGeom>
+        </p:spPr>
+      </p:pic>
+      <p:pic>
+        <p:nvPicPr>
+          <p:cNvPr id="40" name="Picture 39">
+            <a:extLst>
+              <a:ext uri="{FF2B5EF4-FFF2-40B4-BE49-F238E27FC236}">
+                <a16:creationId xmlns:a16="http://schemas.microsoft.com/office/drawing/2014/main" id="{CC96CC66-EADD-4052-9A36-C9E8CAF28909}"/>
+              </a:ext>
+            </a:extLst>
+          </p:cNvPr>
+          <p:cNvPicPr>
+            <a:picLocks noChangeAspect="1"/>
+          </p:cNvPicPr>
+          <p:nvPr/>
+        </p:nvPicPr>
+        <p:blipFill>
+          <a:blip r:embed="rId11"/>
+          <a:stretch>
+            <a:fillRect/>
+          </a:stretch>
+        </p:blipFill>
+        <p:spPr>
+          <a:xfrm>
+            <a:off x="463928" y="4783915"/>
+            <a:ext cx="2114550" cy="371475"/>
+          </a:xfrm>
+          <a:prstGeom prst="rect">
+            <a:avLst/>
+          </a:prstGeom>
+        </p:spPr>
+      </p:pic>
     </p:spTree>
     <p:extLst>
       <p:ext uri="{BB962C8B-B14F-4D97-AF65-F5344CB8AC3E}">

</xml_diff>

<commit_message>
Simplifying case study discussion
</commit_message>
<xml_diff>
--- a/wip-design/figures/thegamma-more.pptx
+++ b/wip-design/figures/thegamma-more.pptx
@@ -2993,8 +2993,8 @@
         </p:blipFill>
         <p:spPr>
           <a:xfrm>
-            <a:off x="5320097" y="5736548"/>
-            <a:ext cx="4080999" cy="1837031"/>
+            <a:off x="5024423" y="5689078"/>
+            <a:ext cx="3846604" cy="1731520"/>
           </a:xfrm>
           <a:prstGeom prst="rect">
             <a:avLst/>
@@ -3219,7 +3219,7 @@
         </p:nvSpPr>
         <p:spPr>
           <a:xfrm>
-            <a:off x="5058840" y="86809"/>
+            <a:off x="4763166" y="86809"/>
             <a:ext cx="261257" cy="261257"/>
           </a:xfrm>
           <a:prstGeom prst="ellipse">
@@ -3287,7 +3287,7 @@
         </p:nvSpPr>
         <p:spPr>
           <a:xfrm>
-            <a:off x="5058839" y="2183216"/>
+            <a:off x="4763165" y="2183216"/>
             <a:ext cx="261257" cy="261257"/>
           </a:xfrm>
           <a:prstGeom prst="ellipse">
@@ -3355,7 +3355,7 @@
         </p:nvSpPr>
         <p:spPr>
           <a:xfrm>
-            <a:off x="5058838" y="4458431"/>
+            <a:off x="4763164" y="4458431"/>
             <a:ext cx="261257" cy="261257"/>
           </a:xfrm>
           <a:prstGeom prst="ellipse">
@@ -3441,10 +3441,10 @@
       </p:pic>
       <p:pic>
         <p:nvPicPr>
-          <p:cNvPr id="12" name="Picture 11">
+          <p:cNvPr id="16" name="Picture 15">
             <a:extLst>
               <a:ext uri="{FF2B5EF4-FFF2-40B4-BE49-F238E27FC236}">
-                <a16:creationId xmlns:a16="http://schemas.microsoft.com/office/drawing/2014/main" id="{78F72602-F922-40A6-AE6F-6E5987E9F53D}"/>
+                <a16:creationId xmlns:a16="http://schemas.microsoft.com/office/drawing/2014/main" id="{536E6E18-65FB-4724-879E-CDB1BF268DE0}"/>
               </a:ext>
             </a:extLst>
           </p:cNvPr>
@@ -3461,37 +3461,7 @@
         </p:blipFill>
         <p:spPr>
           <a:xfrm>
-            <a:off x="5407852" y="446433"/>
-            <a:ext cx="2124372" cy="309606"/>
-          </a:xfrm>
-          <a:prstGeom prst="rect">
-            <a:avLst/>
-          </a:prstGeom>
-        </p:spPr>
-      </p:pic>
-      <p:pic>
-        <p:nvPicPr>
-          <p:cNvPr id="16" name="Picture 15">
-            <a:extLst>
-              <a:ext uri="{FF2B5EF4-FFF2-40B4-BE49-F238E27FC236}">
-                <a16:creationId xmlns:a16="http://schemas.microsoft.com/office/drawing/2014/main" id="{536E6E18-65FB-4724-879E-CDB1BF268DE0}"/>
-              </a:ext>
-            </a:extLst>
-          </p:cNvPr>
-          <p:cNvPicPr>
-            <a:picLocks noChangeAspect="1"/>
-          </p:cNvPicPr>
-          <p:nvPr/>
-        </p:nvPicPr>
-        <p:blipFill>
-          <a:blip r:embed="rId5"/>
-          <a:stretch>
-            <a:fillRect/>
-          </a:stretch>
-        </p:blipFill>
-        <p:spPr>
-          <a:xfrm>
-            <a:off x="5402514" y="4783915"/>
+            <a:off x="5106840" y="4783915"/>
             <a:ext cx="3929611" cy="952633"/>
           </a:xfrm>
           <a:prstGeom prst="rect">
@@ -3514,14 +3484,14 @@
           <p:nvPr/>
         </p:nvPicPr>
         <p:blipFill>
-          <a:blip r:embed="rId6"/>
+          <a:blip r:embed="rId5"/>
           <a:stretch>
             <a:fillRect/>
           </a:stretch>
         </p:blipFill>
         <p:spPr>
           <a:xfrm>
-            <a:off x="5583514" y="790438"/>
+            <a:off x="5375880" y="3010429"/>
             <a:ext cx="3143689" cy="1448002"/>
           </a:xfrm>
           <a:prstGeom prst="rect">
@@ -3544,7 +3514,7 @@
           <p:nvPr/>
         </p:nvPicPr>
         <p:blipFill>
-          <a:blip r:embed="rId7"/>
+          <a:blip r:embed="rId6"/>
           <a:stretch>
             <a:fillRect/>
           </a:stretch>
@@ -3574,7 +3544,7 @@
           <p:nvPr/>
         </p:nvPicPr>
         <p:blipFill>
-          <a:blip r:embed="rId8"/>
+          <a:blip r:embed="rId7"/>
           <a:stretch>
             <a:fillRect/>
           </a:stretch>
@@ -3604,7 +3574,7 @@
           <p:nvPr/>
         </p:nvPicPr>
         <p:blipFill>
-          <a:blip r:embed="rId9"/>
+          <a:blip r:embed="rId8"/>
           <a:stretch>
             <a:fillRect/>
           </a:stretch>
@@ -3633,16 +3603,15 @@
           </p:cNvPicPr>
           <p:nvPr/>
         </p:nvPicPr>
-        <p:blipFill>
-          <a:blip r:embed="rId10"/>
-          <a:stretch>
-            <a:fillRect/>
-          </a:stretch>
+        <p:blipFill rotWithShape="1">
+          <a:blip r:embed="rId9"/>
+          <a:srcRect r="6640"/>
+          <a:stretch/>
         </p:blipFill>
         <p:spPr>
           <a:xfrm>
-            <a:off x="612090" y="5376443"/>
-            <a:ext cx="4043927" cy="1857634"/>
+            <a:off x="463876" y="5338115"/>
+            <a:ext cx="3775397" cy="1857634"/>
           </a:xfrm>
           <a:prstGeom prst="rect">
             <a:avLst/>
@@ -3664,6 +3633,36 @@
           <p:nvPr/>
         </p:nvPicPr>
         <p:blipFill>
+          <a:blip r:embed="rId10"/>
+          <a:stretch>
+            <a:fillRect/>
+          </a:stretch>
+        </p:blipFill>
+        <p:spPr>
+          <a:xfrm>
+            <a:off x="463928" y="4783915"/>
+            <a:ext cx="2114550" cy="371475"/>
+          </a:xfrm>
+          <a:prstGeom prst="rect">
+            <a:avLst/>
+          </a:prstGeom>
+        </p:spPr>
+      </p:pic>
+      <p:pic>
+        <p:nvPicPr>
+          <p:cNvPr id="49" name="Picture 48">
+            <a:extLst>
+              <a:ext uri="{FF2B5EF4-FFF2-40B4-BE49-F238E27FC236}">
+                <a16:creationId xmlns:a16="http://schemas.microsoft.com/office/drawing/2014/main" id="{A2C3480F-421E-49D4-A4A7-DA29508638F7}"/>
+              </a:ext>
+            </a:extLst>
+          </p:cNvPr>
+          <p:cNvPicPr>
+            <a:picLocks noChangeAspect="1"/>
+          </p:cNvPicPr>
+          <p:nvPr/>
+        </p:nvPicPr>
+        <p:blipFill>
           <a:blip r:embed="rId11"/>
           <a:stretch>
             <a:fillRect/>
@@ -3671,8 +3670,67 @@
         </p:blipFill>
         <p:spPr>
           <a:xfrm>
-            <a:off x="463928" y="4783915"/>
-            <a:ext cx="2114550" cy="371475"/>
+            <a:off x="5163963" y="213300"/>
+            <a:ext cx="2505075" cy="490538"/>
+          </a:xfrm>
+          <a:prstGeom prst="rect">
+            <a:avLst/>
+          </a:prstGeom>
+        </p:spPr>
+      </p:pic>
+      <p:pic>
+        <p:nvPicPr>
+          <p:cNvPr id="51" name="Picture 50">
+            <a:extLst>
+              <a:ext uri="{FF2B5EF4-FFF2-40B4-BE49-F238E27FC236}">
+                <a16:creationId xmlns:a16="http://schemas.microsoft.com/office/drawing/2014/main" id="{658D2AFC-C16C-4BB0-B876-49D910FEB2CE}"/>
+              </a:ext>
+            </a:extLst>
+          </p:cNvPr>
+          <p:cNvPicPr>
+            <a:picLocks noChangeAspect="1"/>
+          </p:cNvPicPr>
+          <p:nvPr/>
+        </p:nvPicPr>
+        <p:blipFill rotWithShape="1">
+          <a:blip r:embed="rId12"/>
+          <a:srcRect r="8222"/>
+          <a:stretch/>
+        </p:blipFill>
+        <p:spPr>
+          <a:xfrm>
+            <a:off x="5163963" y="771935"/>
+            <a:ext cx="3707064" cy="1433713"/>
+          </a:xfrm>
+          <a:prstGeom prst="rect">
+            <a:avLst/>
+          </a:prstGeom>
+        </p:spPr>
+      </p:pic>
+      <p:pic>
+        <p:nvPicPr>
+          <p:cNvPr id="55" name="Picture 54">
+            <a:extLst>
+              <a:ext uri="{FF2B5EF4-FFF2-40B4-BE49-F238E27FC236}">
+                <a16:creationId xmlns:a16="http://schemas.microsoft.com/office/drawing/2014/main" id="{0DD21C64-4656-4050-ADD9-6D46D1F44297}"/>
+              </a:ext>
+            </a:extLst>
+          </p:cNvPr>
+          <p:cNvPicPr>
+            <a:picLocks noChangeAspect="1"/>
+          </p:cNvPicPr>
+          <p:nvPr/>
+        </p:nvPicPr>
+        <p:blipFill>
+          <a:blip r:embed="rId13"/>
+          <a:stretch>
+            <a:fillRect/>
+          </a:stretch>
+        </p:blipFill>
+        <p:spPr>
+          <a:xfrm>
+            <a:off x="5163963" y="2499459"/>
+            <a:ext cx="2419350" cy="519113"/>
           </a:xfrm>
           <a:prstGeom prst="rect">
             <a:avLst/>

</xml_diff>